<commit_message>
Correcting displacement test point
</commit_message>
<xml_diff>
--- a/Slide/30-2RGCVS10-2RGC-2.pptx
+++ b/Slide/30-2RGCVS10-2RGC-2.pptx
@@ -115,7 +115,7 @@
 <file path=ppt/charts/chart1.xml><?xml version="1.0" encoding="utf-8"?>
 <c:chartSpace xmlns:c="http://schemas.openxmlformats.org/drawingml/2006/chart" xmlns:a="http://schemas.openxmlformats.org/drawingml/2006/main" xmlns:r="http://schemas.openxmlformats.org/officeDocument/2006/relationships">
   <c:date1904 val="0"/>
-  <c:lang val="ja-JP"/>
+  <c:lang val="en-US"/>
   <c:roundedCorners val="0"/>
   <mc:AlternateContent xmlns:mc="http://schemas.openxmlformats.org/markup-compatibility/2006">
     <mc:Choice xmlns:c14="http://schemas.microsoft.com/office/drawing/2007/8/2/chart" Requires="c14">
@@ -133,7 +133,7 @@
           <a:lstStyle/>
           <a:p>
             <a:pPr>
-              <a:defRPr sz="1862" b="0" i="0" u="none" strike="noStrike" kern="1200" spc="0" baseline="0">
+              <a:defRPr lang="ja-JP" sz="1862" b="0" i="0" u="none" strike="noStrike" kern="1200" spc="0" baseline="0">
                 <a:solidFill>
                   <a:schemeClr val="tx1">
                     <a:lumMod val="65000"/>
@@ -156,8 +156,8 @@
         <c:manualLayout>
           <c:xMode val="edge"/>
           <c:yMode val="edge"/>
-          <c:x val="0.37380068897637797"/>
-          <c:y val="1.4438943894389438E-2"/>
+          <c:x val="0.373800688976378"/>
+          <c:y val="0.0144389438943894"/>
         </c:manualLayout>
       </c:layout>
       <c:overlay val="0"/>
@@ -173,7 +173,7 @@
         <a:lstStyle/>
         <a:p>
           <a:pPr>
-            <a:defRPr sz="1862" b="0" i="0" u="none" strike="noStrike" kern="1200" spc="0" baseline="0">
+            <a:defRPr lang="ja-JP" sz="1862" b="0" i="0" u="none" strike="noStrike" kern="1200" spc="0" baseline="0">
               <a:solidFill>
                 <a:schemeClr val="tx1">
                   <a:lumMod val="65000"/>
@@ -185,7 +185,7 @@
               <a:cs typeface="+mn-cs"/>
             </a:defRPr>
           </a:pPr>
-          <a:endParaRPr lang="ja-JP"/>
+          <a:endParaRPr lang="en-US"/>
         </a:p>
       </c:txPr>
     </c:title>
@@ -196,10 +196,10 @@
           <c:layoutTarget val="inner"/>
           <c:xMode val="edge"/>
           <c:yMode val="edge"/>
-          <c:x val="0.20827140748031497"/>
+          <c:x val="0.208271407480315"/>
           <c:y val="0.101992704191679"/>
-          <c:w val="0.67958796751968509"/>
-          <c:h val="0.80242635976196042"/>
+          <c:w val="0.679587967519685"/>
+          <c:h val="0.80242635976196"/>
         </c:manualLayout>
       </c:layout>
       <c:scatterChart>
@@ -248,463 +248,463 @@
                 <c:formatCode>0.0</c:formatCode>
                 <c:ptCount val="229"/>
                 <c:pt idx="0">
-                  <c:v>414243.75541914301</c:v>
+                  <c:v>414243.755419143</c:v>
                 </c:pt>
                 <c:pt idx="1">
-                  <c:v>414243.75541914301</c:v>
+                  <c:v>414243.755419143</c:v>
                 </c:pt>
                 <c:pt idx="2">
-                  <c:v>335900.72201280325</c:v>
+                  <c:v>335900.7220128033</c:v>
                 </c:pt>
                 <c:pt idx="3">
-                  <c:v>477612.55267435207</c:v>
+                  <c:v>477612.552674352</c:v>
                 </c:pt>
                 <c:pt idx="4">
-                  <c:v>477612.55267435207</c:v>
+                  <c:v>477612.552674352</c:v>
                 </c:pt>
                 <c:pt idx="5">
-                  <c:v>382614.62374416948</c:v>
+                  <c:v>382614.6237441695</c:v>
                 </c:pt>
                 <c:pt idx="6">
-                  <c:v>183262.81157570519</c:v>
+                  <c:v>183262.8115757052</c:v>
                 </c:pt>
                 <c:pt idx="7">
-                  <c:v>513289.10483540664</c:v>
+                  <c:v>513289.1048354066</c:v>
                 </c:pt>
                 <c:pt idx="8">
-                  <c:v>490471.35346270807</c:v>
+                  <c:v>490471.3534627081</c:v>
                 </c:pt>
                 <c:pt idx="9">
-                  <c:v>543241.96454768965</c:v>
+                  <c:v>543241.9645476895</c:v>
                 </c:pt>
                 <c:pt idx="10">
-                  <c:v>640106.72878122528</c:v>
+                  <c:v>640106.7287812253</c:v>
                 </c:pt>
                 <c:pt idx="11">
-                  <c:v>640106.72878122528</c:v>
+                  <c:v>640106.7287812253</c:v>
                 </c:pt>
                 <c:pt idx="12">
                   <c:v>449947.3508481218</c:v>
                 </c:pt>
                 <c:pt idx="13">
-                  <c:v>423170.22449519619</c:v>
+                  <c:v>423170.2244951962</c:v>
                 </c:pt>
                 <c:pt idx="14">
-                  <c:v>415689.17028086056</c:v>
+                  <c:v>415689.1702808606</c:v>
                 </c:pt>
                 <c:pt idx="15">
-                  <c:v>810840.69033902115</c:v>
+                  <c:v>810840.690339021</c:v>
                 </c:pt>
                 <c:pt idx="16">
-                  <c:v>709226.62962631905</c:v>
+                  <c:v>709226.629626319</c:v>
                 </c:pt>
                 <c:pt idx="17">
                   <c:v>729650.628572335</c:v>
                 </c:pt>
                 <c:pt idx="18">
-                  <c:v>413361.84176341072</c:v>
+                  <c:v>413361.8417634107</c:v>
                 </c:pt>
                 <c:pt idx="19">
-                  <c:v>413361.84176341072</c:v>
+                  <c:v>413361.8417634107</c:v>
                 </c:pt>
                 <c:pt idx="20">
-                  <c:v>543868.86508733162</c:v>
+                  <c:v>543868.8650873318</c:v>
                 </c:pt>
                 <c:pt idx="21">
-                  <c:v>393522.35205702198</c:v>
+                  <c:v>393522.3520570219</c:v>
                 </c:pt>
                 <c:pt idx="22">
-                  <c:v>537208.24852609262</c:v>
+                  <c:v>537208.2485260926</c:v>
                 </c:pt>
                 <c:pt idx="23">
-                  <c:v>537208.24852609262</c:v>
+                  <c:v>537208.2485260926</c:v>
                 </c:pt>
                 <c:pt idx="24">
-                  <c:v>231292.98307394641</c:v>
+                  <c:v>231292.9830739464</c:v>
                 </c:pt>
                 <c:pt idx="25">
-                  <c:v>726690.47943110717</c:v>
+                  <c:v>726690.4794311072</c:v>
                 </c:pt>
                 <c:pt idx="26">
-                  <c:v>921642.8400882018</c:v>
+                  <c:v>921642.840088202</c:v>
                 </c:pt>
                 <c:pt idx="27">
                   <c:v>212840.3717368439</c:v>
                 </c:pt>
                 <c:pt idx="28">
-                  <c:v>34853.493249518244</c:v>
+                  <c:v>34853.49324951824</c:v>
                 </c:pt>
                 <c:pt idx="29">
-                  <c:v>39266.154630635887</c:v>
+                  <c:v>39266.15463063589</c:v>
                 </c:pt>
                 <c:pt idx="30">
-                  <c:v>389847.73752724216</c:v>
+                  <c:v>389847.7375272422</c:v>
                 </c:pt>
                 <c:pt idx="31">
-                  <c:v>247292.85856353311</c:v>
+                  <c:v>247292.8585635331</c:v>
                 </c:pt>
                 <c:pt idx="32">
-                  <c:v>247292.85856353311</c:v>
+                  <c:v>247292.8585635331</c:v>
                 </c:pt>
                 <c:pt idx="33">
-                  <c:v>711777.35707005358</c:v>
+                  <c:v>711777.3570700536</c:v>
                 </c:pt>
                 <c:pt idx="34">
-                  <c:v>459847.3418146146</c:v>
+                  <c:v>459847.3418146145</c:v>
                 </c:pt>
                 <c:pt idx="35">
-                  <c:v>459847.3418146146</c:v>
+                  <c:v>459847.3418146145</c:v>
                 </c:pt>
                 <c:pt idx="36">
-                  <c:v>678974.95118187589</c:v>
+                  <c:v>678974.951181876</c:v>
                 </c:pt>
                 <c:pt idx="37">
-                  <c:v>678974.95118187589</c:v>
+                  <c:v>678974.951181876</c:v>
                 </c:pt>
                 <c:pt idx="38">
-                  <c:v>453558.86397618451</c:v>
+                  <c:v>453558.8639761845</c:v>
                 </c:pt>
                 <c:pt idx="39">
-                  <c:v>359582.63637532503</c:v>
+                  <c:v>359582.6363753251</c:v>
                 </c:pt>
                 <c:pt idx="40">
-                  <c:v>775899.62274622894</c:v>
+                  <c:v>775899.622746229</c:v>
                 </c:pt>
                 <c:pt idx="41">
-                  <c:v>775899.62274622894</c:v>
+                  <c:v>775899.622746229</c:v>
                 </c:pt>
                 <c:pt idx="42">
-                  <c:v>727151.49874525808</c:v>
+                  <c:v>727151.4987452581</c:v>
                 </c:pt>
                 <c:pt idx="43">
-                  <c:v>727151.49874525808</c:v>
+                  <c:v>727151.4987452581</c:v>
                 </c:pt>
                 <c:pt idx="44">
-                  <c:v>742599.40594223083</c:v>
+                  <c:v>742599.4059422308</c:v>
                 </c:pt>
                 <c:pt idx="45">
-                  <c:v>773992.22057508631</c:v>
+                  <c:v>773992.2205750863</c:v>
                 </c:pt>
                 <c:pt idx="46">
-                  <c:v>160843.29326868805</c:v>
+                  <c:v>160843.2932686881</c:v>
                 </c:pt>
                 <c:pt idx="47">
-                  <c:v>179388.98848662773</c:v>
+                  <c:v>179388.9884866277</c:v>
                 </c:pt>
                 <c:pt idx="48">
-                  <c:v>387296.71871527628</c:v>
+                  <c:v>387296.7187152762</c:v>
                 </c:pt>
                 <c:pt idx="49">
-                  <c:v>301608.73984061088</c:v>
+                  <c:v>301608.739840611</c:v>
                 </c:pt>
                 <c:pt idx="50">
-                  <c:v>234373.56445291711</c:v>
+                  <c:v>234373.5644529171</c:v>
                 </c:pt>
                 <c:pt idx="51">
-                  <c:v>665245.5707724141</c:v>
+                  <c:v>665245.570772414</c:v>
                 </c:pt>
                 <c:pt idx="52">
-                  <c:v>139007.50345392112</c:v>
+                  <c:v>139007.5034539211</c:v>
                 </c:pt>
                 <c:pt idx="53">
-                  <c:v>683481.62365314993</c:v>
+                  <c:v>683481.62365315</c:v>
                 </c:pt>
                 <c:pt idx="54">
-                  <c:v>487753.42147578776</c:v>
+                  <c:v>487753.4214757878</c:v>
                 </c:pt>
                 <c:pt idx="55">
-                  <c:v>213838.34359062221</c:v>
+                  <c:v>213838.3435906222</c:v>
                 </c:pt>
                 <c:pt idx="56">
-                  <c:v>90831.937158185581</c:v>
+                  <c:v>90831.93715818558</c:v>
                 </c:pt>
                 <c:pt idx="57">
-                  <c:v>80261.561182741658</c:v>
+                  <c:v>80261.56118274167</c:v>
                 </c:pt>
                 <c:pt idx="58">
-                  <c:v>484467.42838385078</c:v>
+                  <c:v>484467.4283838508</c:v>
                 </c:pt>
                 <c:pt idx="59">
-                  <c:v>484467.42838385078</c:v>
+                  <c:v>484467.4283838508</c:v>
                 </c:pt>
                 <c:pt idx="60">
-                  <c:v>416825.78760082816</c:v>
+                  <c:v>416825.7876008282</c:v>
                 </c:pt>
                 <c:pt idx="61">
-                  <c:v>416825.78760082816</c:v>
+                  <c:v>416825.7876008282</c:v>
                 </c:pt>
                 <c:pt idx="62">
-                  <c:v>327297.96618357667</c:v>
+                  <c:v>327297.9661835767</c:v>
                 </c:pt>
                 <c:pt idx="63">
-                  <c:v>393202.74580545671</c:v>
+                  <c:v>393202.7458054567</c:v>
                 </c:pt>
                 <c:pt idx="64">
-                  <c:v>393202.74580545671</c:v>
+                  <c:v>393202.7458054567</c:v>
                 </c:pt>
                 <c:pt idx="65">
-                  <c:v>738447.52765712526</c:v>
+                  <c:v>738447.5276571254</c:v>
                 </c:pt>
                 <c:pt idx="66">
-                  <c:v>729388.08686663152</c:v>
+                  <c:v>729388.0868666316</c:v>
                 </c:pt>
                 <c:pt idx="67">
-                  <c:v>840095.23411674285</c:v>
+                  <c:v>840095.2341167427</c:v>
                 </c:pt>
                 <c:pt idx="68">
-                  <c:v>840095.23411674285</c:v>
+                  <c:v>840095.2341167427</c:v>
                 </c:pt>
                 <c:pt idx="69">
-                  <c:v>238651.63942159386</c:v>
+                  <c:v>238651.6394215938</c:v>
                 </c:pt>
                 <c:pt idx="70">
-                  <c:v>166683.51844379891</c:v>
+                  <c:v>166683.518443799</c:v>
                 </c:pt>
                 <c:pt idx="71">
-                  <c:v>474355.55087880098</c:v>
+                  <c:v>474355.5508788009</c:v>
                 </c:pt>
                 <c:pt idx="72">
-                  <c:v>410437.59485181392</c:v>
+                  <c:v>410437.594851814</c:v>
                 </c:pt>
                 <c:pt idx="73">
-                  <c:v>371897.37197505642</c:v>
+                  <c:v>371897.3719750564</c:v>
                 </c:pt>
                 <c:pt idx="74">
-                  <c:v>418444.87708680093</c:v>
+                  <c:v>418444.8770868009</c:v>
                 </c:pt>
                 <c:pt idx="75">
-                  <c:v>445196.28985753492</c:v>
+                  <c:v>445196.2898575349</c:v>
                 </c:pt>
                 <c:pt idx="76">
-                  <c:v>725244.58757647278</c:v>
+                  <c:v>725244.5875764727</c:v>
                 </c:pt>
                 <c:pt idx="77">
                   <c:v>228853.445899532</c:v>
                 </c:pt>
                 <c:pt idx="78">
-                  <c:v>682645.36303488037</c:v>
+                  <c:v>682645.3630348806</c:v>
                 </c:pt>
                 <c:pt idx="79">
-                  <c:v>720421.59397451498</c:v>
+                  <c:v>720421.593974515</c:v>
                 </c:pt>
                 <c:pt idx="80">
-                  <c:v>770244.14814470347</c:v>
+                  <c:v>770244.1481447035</c:v>
                 </c:pt>
                 <c:pt idx="81">
-                  <c:v>750734.04933448532</c:v>
+                  <c:v>750734.0493344853</c:v>
                 </c:pt>
                 <c:pt idx="82">
-                  <c:v>528685.78262928769</c:v>
+                  <c:v>528685.7826292876</c:v>
                 </c:pt>
                 <c:pt idx="83">
-                  <c:v>527863.88481527509</c:v>
+                  <c:v>527863.8848152751</c:v>
                 </c:pt>
                 <c:pt idx="84">
-                  <c:v>86343.679717164792</c:v>
+                  <c:v>86343.6797171648</c:v>
                 </c:pt>
                 <c:pt idx="85">
-                  <c:v>413082.01781123294</c:v>
+                  <c:v>413082.0178112329</c:v>
                 </c:pt>
                 <c:pt idx="86">
-                  <c:v>413082.01781123294</c:v>
+                  <c:v>413082.0178112329</c:v>
                 </c:pt>
                 <c:pt idx="87">
-                  <c:v>351652.13819599251</c:v>
+                  <c:v>351652.1381959924</c:v>
                 </c:pt>
                 <c:pt idx="88">
-                  <c:v>699733.8229236817</c:v>
+                  <c:v>699733.8229236818</c:v>
                 </c:pt>
                 <c:pt idx="89">
-                  <c:v>699733.8229236817</c:v>
+                  <c:v>699733.8229236818</c:v>
                 </c:pt>
                 <c:pt idx="90">
-                  <c:v>658598.72198474768</c:v>
+                  <c:v>658598.7219847477</c:v>
                 </c:pt>
                 <c:pt idx="91">
-                  <c:v>698537.18924779084</c:v>
+                  <c:v>698537.1892477907</c:v>
                 </c:pt>
                 <c:pt idx="92">
-                  <c:v>659675.42758018465</c:v>
+                  <c:v>659675.4275801845</c:v>
                 </c:pt>
                 <c:pt idx="93">
-                  <c:v>613664.54155164224</c:v>
+                  <c:v>613664.5415516423</c:v>
                 </c:pt>
                 <c:pt idx="94">
-                  <c:v>412505.48642644222</c:v>
+                  <c:v>412505.4864264422</c:v>
                 </c:pt>
                 <c:pt idx="95">
-                  <c:v>320445.58720267157</c:v>
+                  <c:v>320445.5872026716</c:v>
                 </c:pt>
                 <c:pt idx="96">
-                  <c:v>293704.99875423661</c:v>
+                  <c:v>293704.9987542365</c:v>
                 </c:pt>
                 <c:pt idx="97">
-                  <c:v>909591.48729776044</c:v>
+                  <c:v>909591.4872977603</c:v>
                 </c:pt>
                 <c:pt idx="98">
-                  <c:v>909591.48729776044</c:v>
+                  <c:v>909591.4872977603</c:v>
                 </c:pt>
                 <c:pt idx="99">
-                  <c:v>908162.2294580359</c:v>
+                  <c:v>908162.229458036</c:v>
                 </c:pt>
                 <c:pt idx="100">
-                  <c:v>908162.2294580359</c:v>
+                  <c:v>908162.229458036</c:v>
                 </c:pt>
                 <c:pt idx="101">
-                  <c:v>312793.20164599695</c:v>
+                  <c:v>312793.2016459969</c:v>
                 </c:pt>
                 <c:pt idx="102">
-                  <c:v>374941.59012599092</c:v>
+                  <c:v>374941.5901259909</c:v>
                 </c:pt>
                 <c:pt idx="103">
-                  <c:v>23687.233176013724</c:v>
+                  <c:v>23687.23317601372</c:v>
                 </c:pt>
                 <c:pt idx="104">
                   <c:v>25261.316156097</c:v>
                 </c:pt>
                 <c:pt idx="105">
-                  <c:v>63663.797275210003</c:v>
+                  <c:v>63663.79727521</c:v>
                 </c:pt>
                 <c:pt idx="106">
-                  <c:v>63663.797275210003</c:v>
+                  <c:v>63663.79727521</c:v>
                 </c:pt>
                 <c:pt idx="107">
-                  <c:v>113496.46502759965</c:v>
+                  <c:v>113496.4650275996</c:v>
                 </c:pt>
                 <c:pt idx="108">
-                  <c:v>113496.46502759965</c:v>
+                  <c:v>113496.4650275996</c:v>
                 </c:pt>
                 <c:pt idx="109">
-                  <c:v>299888.35573102452</c:v>
+                  <c:v>299888.3557310245</c:v>
                 </c:pt>
                 <c:pt idx="110">
-                  <c:v>14120.763567836342</c:v>
+                  <c:v>14120.76356783635</c:v>
                 </c:pt>
                 <c:pt idx="111">
-                  <c:v>62526.420725468925</c:v>
+                  <c:v>62526.42072546893</c:v>
                 </c:pt>
                 <c:pt idx="112">
                   <c:v>689374.9706809686</c:v>
                 </c:pt>
                 <c:pt idx="113">
-                  <c:v>535889.82495355862</c:v>
+                  <c:v>535889.8249535586</c:v>
                 </c:pt>
                 <c:pt idx="114">
-                  <c:v>663267.90478934918</c:v>
+                  <c:v>663267.9047893492</c:v>
                 </c:pt>
                 <c:pt idx="115">
-                  <c:v>733961.63399512577</c:v>
+                  <c:v>733961.6339951258</c:v>
                 </c:pt>
                 <c:pt idx="116">
-                  <c:v>512599.14888692676</c:v>
+                  <c:v>512599.1488869267</c:v>
                 </c:pt>
                 <c:pt idx="117">
-                  <c:v>641374.24223622237</c:v>
+                  <c:v>641374.2422362225</c:v>
                 </c:pt>
                 <c:pt idx="118">
-                  <c:v>641374.24223622237</c:v>
+                  <c:v>641374.2422362225</c:v>
                 </c:pt>
                 <c:pt idx="119">
-                  <c:v>656438.04026284034</c:v>
+                  <c:v>656438.0402628404</c:v>
                 </c:pt>
                 <c:pt idx="120">
-                  <c:v>161869.96118275693</c:v>
+                  <c:v>161869.9611827569</c:v>
                 </c:pt>
                 <c:pt idx="121">
-                  <c:v>350335.21405907843</c:v>
+                  <c:v>350335.2140590785</c:v>
                 </c:pt>
                 <c:pt idx="122">
-                  <c:v>310927.43254958437</c:v>
+                  <c:v>310927.4325495844</c:v>
                 </c:pt>
                 <c:pt idx="123">
-                  <c:v>75332.660892457337</c:v>
+                  <c:v>75332.66089245733</c:v>
                 </c:pt>
                 <c:pt idx="124">
-                  <c:v>445412.44590001024</c:v>
+                  <c:v>445412.4459000102</c:v>
                 </c:pt>
                 <c:pt idx="125">
-                  <c:v>120496.65469248673</c:v>
+                  <c:v>120496.6546924867</c:v>
                 </c:pt>
                 <c:pt idx="126">
-                  <c:v>192502.06514965813</c:v>
+                  <c:v>192502.0651496582</c:v>
                 </c:pt>
                 <c:pt idx="127">
-                  <c:v>77659.027109828952</c:v>
+                  <c:v>77659.02710982895</c:v>
                 </c:pt>
                 <c:pt idx="128">
                   <c:v>435016.4419161721</c:v>
                 </c:pt>
                 <c:pt idx="129">
-                  <c:v>656682.51454330189</c:v>
+                  <c:v>656682.5145433019</c:v>
                 </c:pt>
                 <c:pt idx="130">
-                  <c:v>523964.06573182822</c:v>
+                  <c:v>523964.0657318282</c:v>
                 </c:pt>
                 <c:pt idx="131">
-                  <c:v>647597.69156909327</c:v>
+                  <c:v>647597.6915690933</c:v>
                 </c:pt>
                 <c:pt idx="132">
-                  <c:v>819645.97986311372</c:v>
+                  <c:v>819645.9798631137</c:v>
                 </c:pt>
                 <c:pt idx="133">
-                  <c:v>869099.19161284994</c:v>
+                  <c:v>869099.19161285</c:v>
                 </c:pt>
                 <c:pt idx="134">
-                  <c:v>728528.94741818134</c:v>
+                  <c:v>728528.9474181813</c:v>
                 </c:pt>
                 <c:pt idx="135">
-                  <c:v>755500.66704527009</c:v>
+                  <c:v>755500.6670452701</c:v>
                 </c:pt>
                 <c:pt idx="136">
-                  <c:v>667767.79613253765</c:v>
+                  <c:v>667767.7961325375</c:v>
                 </c:pt>
                 <c:pt idx="137">
-                  <c:v>707568.84892555792</c:v>
+                  <c:v>707568.848925558</c:v>
                 </c:pt>
                 <c:pt idx="138">
-                  <c:v>673398.77086753864</c:v>
+                  <c:v>673398.7708675386</c:v>
                 </c:pt>
                 <c:pt idx="139">
-                  <c:v>673398.77086753864</c:v>
+                  <c:v>673398.7708675386</c:v>
                 </c:pt>
                 <c:pt idx="140">
-                  <c:v>514871.24209742091</c:v>
+                  <c:v>514871.2420974209</c:v>
                 </c:pt>
                 <c:pt idx="141">
-                  <c:v>302836.17183371971</c:v>
+                  <c:v>302836.1718337197</c:v>
                 </c:pt>
                 <c:pt idx="142">
-                  <c:v>302836.17183371971</c:v>
+                  <c:v>302836.1718337197</c:v>
                 </c:pt>
                 <c:pt idx="143">
-                  <c:v>308369.32906373509</c:v>
+                  <c:v>308369.3290637351</c:v>
                 </c:pt>
                 <c:pt idx="144">
-                  <c:v>375092.06028930604</c:v>
+                  <c:v>375092.0602893061</c:v>
                 </c:pt>
                 <c:pt idx="145">
-                  <c:v>375092.06028930604</c:v>
+                  <c:v>375092.0602893061</c:v>
                 </c:pt>
                 <c:pt idx="146">
-                  <c:v>326988.69917837298</c:v>
+                  <c:v>326988.699178373</c:v>
                 </c:pt>
                 <c:pt idx="147">
-                  <c:v>165256.36755678066</c:v>
+                  <c:v>165256.3675567807</c:v>
                 </c:pt>
                 <c:pt idx="148">
-                  <c:v>165256.36755678066</c:v>
+                  <c:v>165256.3675567807</c:v>
                 </c:pt>
                 <c:pt idx="149">
-                  <c:v>166915.38740736264</c:v>
+                  <c:v>166915.3874073626</c:v>
                 </c:pt>
                 <c:pt idx="150">
-                  <c:v>270986.46146044054</c:v>
+                  <c:v>270986.4614604406</c:v>
                 </c:pt>
                 <c:pt idx="151">
-                  <c:v>161448.31784783988</c:v>
+                  <c:v>161448.31784784</c:v>
                 </c:pt>
                 <c:pt idx="152">
-                  <c:v>56106.318008435112</c:v>
+                  <c:v>56106.31800843511</c:v>
                 </c:pt>
                 <c:pt idx="153">
                   <c:v>70804.24016009357</c:v>
@@ -713,214 +713,214 @@
                   <c:v>760066.4403090016</c:v>
                 </c:pt>
                 <c:pt idx="155">
-                  <c:v>803331.0512495595</c:v>
+                  <c:v>803331.0512495594</c:v>
                 </c:pt>
                 <c:pt idx="156">
-                  <c:v>498084.12398516573</c:v>
+                  <c:v>498084.1239851658</c:v>
                 </c:pt>
                 <c:pt idx="157">
-                  <c:v>668682.22633456776</c:v>
+                  <c:v>668682.2263345678</c:v>
                 </c:pt>
                 <c:pt idx="158">
-                  <c:v>494457.33296599344</c:v>
+                  <c:v>494457.3329659934</c:v>
                 </c:pt>
                 <c:pt idx="159">
-                  <c:v>497418.10493814695</c:v>
+                  <c:v>497418.1049381469</c:v>
                 </c:pt>
                 <c:pt idx="160">
-                  <c:v>425339.24657186749</c:v>
+                  <c:v>425339.2465718675</c:v>
                 </c:pt>
                 <c:pt idx="161">
-                  <c:v>675446.10906436853</c:v>
+                  <c:v>675446.1090643684</c:v>
                 </c:pt>
                 <c:pt idx="162">
-                  <c:v>454913.96524585306</c:v>
+                  <c:v>454913.9652458531</c:v>
                 </c:pt>
                 <c:pt idx="163">
-                  <c:v>745734.27733286342</c:v>
+                  <c:v>745734.2773328632</c:v>
                 </c:pt>
                 <c:pt idx="164">
-                  <c:v>562509.24051338178</c:v>
+                  <c:v>562509.2405133818</c:v>
                 </c:pt>
                 <c:pt idx="165">
-                  <c:v>610967.84557567805</c:v>
+                  <c:v>610967.845575678</c:v>
                 </c:pt>
                 <c:pt idx="166">
-                  <c:v>820613.44978151028</c:v>
+                  <c:v>820613.4497815103</c:v>
                 </c:pt>
                 <c:pt idx="167">
-                  <c:v>97965.769922887455</c:v>
+                  <c:v>97965.76992288745</c:v>
                 </c:pt>
                 <c:pt idx="168">
-                  <c:v>107125.89014046626</c:v>
+                  <c:v>107125.8901404663</c:v>
                 </c:pt>
                 <c:pt idx="169">
-                  <c:v>94699.582078879059</c:v>
+                  <c:v>94699.58207887904</c:v>
                 </c:pt>
                 <c:pt idx="170">
                   <c:v>519296.1948128473</c:v>
                 </c:pt>
                 <c:pt idx="171">
-                  <c:v>540719.07187783404</c:v>
+                  <c:v>540719.071877834</c:v>
                 </c:pt>
                 <c:pt idx="172">
-                  <c:v>591687.98119266052</c:v>
+                  <c:v>591687.9811926604</c:v>
                 </c:pt>
                 <c:pt idx="173">
-                  <c:v>607261.57784879277</c:v>
+                  <c:v>607261.5778487927</c:v>
                 </c:pt>
                 <c:pt idx="174">
-                  <c:v>272784.76933698892</c:v>
+                  <c:v>272784.7693369889</c:v>
                 </c:pt>
                 <c:pt idx="175">
-                  <c:v>595094.28175263002</c:v>
+                  <c:v>595094.28175263</c:v>
                 </c:pt>
                 <c:pt idx="176">
-                  <c:v>595094.28175263002</c:v>
+                  <c:v>595094.28175263</c:v>
                 </c:pt>
                 <c:pt idx="177">
-                  <c:v>595094.28175263002</c:v>
+                  <c:v>595094.28175263</c:v>
                 </c:pt>
                 <c:pt idx="178">
-                  <c:v>559610.24630812195</c:v>
+                  <c:v>559610.246308122</c:v>
                 </c:pt>
                 <c:pt idx="179">
                   <c:v>515378.0128297995</c:v>
                 </c:pt>
                 <c:pt idx="180">
-                  <c:v>406063.89728305291</c:v>
+                  <c:v>406063.897283053</c:v>
                 </c:pt>
                 <c:pt idx="181">
-                  <c:v>478691.91424084455</c:v>
+                  <c:v>478691.9142408446</c:v>
                 </c:pt>
                 <c:pt idx="182">
-                  <c:v>749312.33718085592</c:v>
+                  <c:v>749312.337180856</c:v>
                 </c:pt>
                 <c:pt idx="183">
-                  <c:v>549938.90742972086</c:v>
+                  <c:v>549938.907429721</c:v>
                 </c:pt>
                 <c:pt idx="184">
-                  <c:v>577314.90279871307</c:v>
+                  <c:v>577314.9027987131</c:v>
                 </c:pt>
                 <c:pt idx="185">
-                  <c:v>586407.44280223781</c:v>
+                  <c:v>586407.442802238</c:v>
                 </c:pt>
                 <c:pt idx="186">
-                  <c:v>646999.86982851347</c:v>
+                  <c:v>646999.8698285135</c:v>
                 </c:pt>
                 <c:pt idx="187">
-                  <c:v>497878.55399960012</c:v>
+                  <c:v>497878.5539996001</c:v>
                 </c:pt>
                 <c:pt idx="188">
-                  <c:v>497878.55399960012</c:v>
+                  <c:v>497878.5539996001</c:v>
                 </c:pt>
                 <c:pt idx="189">
-                  <c:v>854030.02616332576</c:v>
+                  <c:v>854030.0261633258</c:v>
                 </c:pt>
                 <c:pt idx="190">
-                  <c:v>542057.81247518305</c:v>
+                  <c:v>542057.812475183</c:v>
                 </c:pt>
                 <c:pt idx="191">
-                  <c:v>326712.62029584881</c:v>
+                  <c:v>326712.6202958488</c:v>
                 </c:pt>
                 <c:pt idx="192">
-                  <c:v>51786.220745351646</c:v>
+                  <c:v>51786.22074535163</c:v>
                 </c:pt>
                 <c:pt idx="193">
-                  <c:v>8698.3229262394489</c:v>
+                  <c:v>8698.322926239447</c:v>
                 </c:pt>
                 <c:pt idx="194">
-                  <c:v>518166.35127427697</c:v>
+                  <c:v>518166.3512742769</c:v>
                 </c:pt>
                 <c:pt idx="195">
-                  <c:v>588508.24228140968</c:v>
+                  <c:v>588508.2422814097</c:v>
                 </c:pt>
                 <c:pt idx="196">
-                  <c:v>742280.48728438106</c:v>
+                  <c:v>742280.4872843811</c:v>
                 </c:pt>
                 <c:pt idx="197">
-                  <c:v>776089.41305248847</c:v>
+                  <c:v>776089.4130524885</c:v>
                 </c:pt>
                 <c:pt idx="198">
-                  <c:v>331367.86442455731</c:v>
+                  <c:v>331367.8644245573</c:v>
                 </c:pt>
                 <c:pt idx="199">
-                  <c:v>382147.85570160137</c:v>
+                  <c:v>382147.8557016013</c:v>
                 </c:pt>
                 <c:pt idx="200">
-                  <c:v>432731.65211169113</c:v>
+                  <c:v>432731.6521116911</c:v>
                 </c:pt>
                 <c:pt idx="201">
                   <c:v>102055.2352277337</c:v>
                 </c:pt>
                 <c:pt idx="202">
-                  <c:v>116585.71907013556</c:v>
+                  <c:v>116585.7190701356</c:v>
                 </c:pt>
                 <c:pt idx="203">
-                  <c:v>123746.09194512352</c:v>
+                  <c:v>123746.0919451235</c:v>
                 </c:pt>
                 <c:pt idx="204">
-                  <c:v>453267.05535512284</c:v>
+                  <c:v>453267.0553551228</c:v>
                 </c:pt>
                 <c:pt idx="205">
-                  <c:v>269993.99875311204</c:v>
+                  <c:v>269993.998753112</c:v>
                 </c:pt>
                 <c:pt idx="206">
-                  <c:v>152043.21024417019</c:v>
+                  <c:v>152043.2102441702</c:v>
                 </c:pt>
                 <c:pt idx="207">
-                  <c:v>152043.21024417019</c:v>
+                  <c:v>152043.2102441702</c:v>
                 </c:pt>
                 <c:pt idx="208">
-                  <c:v>33930.638515767554</c:v>
+                  <c:v>33930.63851576756</c:v>
                 </c:pt>
                 <c:pt idx="209">
-                  <c:v>33930.638515767554</c:v>
+                  <c:v>33930.63851576756</c:v>
                 </c:pt>
                 <c:pt idx="210">
-                  <c:v>563429.33537651517</c:v>
+                  <c:v>563429.3353765152</c:v>
                 </c:pt>
                 <c:pt idx="211">
-                  <c:v>980199.42083554179</c:v>
+                  <c:v>980199.420835542</c:v>
                 </c:pt>
                 <c:pt idx="212">
-                  <c:v>515746.65227980644</c:v>
+                  <c:v>515746.6522798064</c:v>
                 </c:pt>
                 <c:pt idx="213">
-                  <c:v>515746.65227980644</c:v>
+                  <c:v>515746.6522798064</c:v>
                 </c:pt>
                 <c:pt idx="214">
-                  <c:v>345179.71431849297</c:v>
+                  <c:v>345179.714318493</c:v>
                 </c:pt>
                 <c:pt idx="215">
-                  <c:v>345179.71431849297</c:v>
+                  <c:v>345179.714318493</c:v>
                 </c:pt>
                 <c:pt idx="216">
-                  <c:v>1083301.7702359119</c:v>
+                  <c:v>1.08330177023591E6</c:v>
                 </c:pt>
                 <c:pt idx="217">
-                  <c:v>287523.24219779973</c:v>
+                  <c:v>287523.2421977997</c:v>
                 </c:pt>
                 <c:pt idx="218">
-                  <c:v>427104.64743154024</c:v>
+                  <c:v>427104.6474315402</c:v>
                 </c:pt>
                 <c:pt idx="219">
                   <c:v>826115.133650103</c:v>
                 </c:pt>
                 <c:pt idx="220">
-                  <c:v>885909.90036918118</c:v>
+                  <c:v>885909.9003691812</c:v>
                 </c:pt>
                 <c:pt idx="221">
-                  <c:v>748105.30019872403</c:v>
+                  <c:v>748105.300198724</c:v>
                 </c:pt>
                 <c:pt idx="222">
-                  <c:v>912617.54998405406</c:v>
+                  <c:v>912617.5499840541</c:v>
                 </c:pt>
                 <c:pt idx="223">
-                  <c:v>944810.90427824354</c:v>
+                  <c:v>944810.9042782434</c:v>
                 </c:pt>
                 <c:pt idx="224">
-                  <c:v>993692.52130399516</c:v>
+                  <c:v>993692.5213039952</c:v>
                 </c:pt>
               </c:numCache>
             </c:numRef>
@@ -932,241 +932,241 @@
                 <c:formatCode>General</c:formatCode>
                 <c:ptCount val="229"/>
                 <c:pt idx="0">
-                  <c:v>359530.11844951438</c:v>
+                  <c:v>359530.1184495144</c:v>
                 </c:pt>
                 <c:pt idx="1">
-                  <c:v>358169.41689984518</c:v>
+                  <c:v>358169.4168998452</c:v>
                 </c:pt>
                 <c:pt idx="2">
                   <c:v>368900.9380128425</c:v>
                 </c:pt>
                 <c:pt idx="3">
-                  <c:v>794286.67726380157</c:v>
+                  <c:v>794286.6772638016</c:v>
                 </c:pt>
                 <c:pt idx="4">
-                  <c:v>670174.10583567258</c:v>
+                  <c:v>670174.1058356726</c:v>
                 </c:pt>
                 <c:pt idx="5">
-                  <c:v>712401.28630105034</c:v>
+                  <c:v>712401.2863010502</c:v>
                 </c:pt>
                 <c:pt idx="6">
-                  <c:v>660583.80762891087</c:v>
+                  <c:v>660583.807628911</c:v>
                 </c:pt>
                 <c:pt idx="7">
-                  <c:v>1014610.9731764467</c:v>
+                  <c:v>1.01461097317645E6</c:v>
                 </c:pt>
                 <c:pt idx="8">
-                  <c:v>569264.70617099421</c:v>
+                  <c:v>569264.7061709941</c:v>
                 </c:pt>
                 <c:pt idx="9">
-                  <c:v>639530.36662169953</c:v>
+                  <c:v>639530.3666216996</c:v>
                 </c:pt>
                 <c:pt idx="10">
-                  <c:v>867649.29356581101</c:v>
+                  <c:v>867649.293565811</c:v>
                 </c:pt>
                 <c:pt idx="11">
-                  <c:v>922419.02287718176</c:v>
+                  <c:v>922419.0228771818</c:v>
                 </c:pt>
                 <c:pt idx="12">
-                  <c:v>970628.03310719389</c:v>
+                  <c:v>970628.033107194</c:v>
                 </c:pt>
                 <c:pt idx="13">
-                  <c:v>758559.27763242286</c:v>
+                  <c:v>758559.2776324229</c:v>
                 </c:pt>
                 <c:pt idx="14">
-                  <c:v>703524.96415340283</c:v>
+                  <c:v>703524.9641534028</c:v>
                 </c:pt>
                 <c:pt idx="15">
-                  <c:v>1258059.7839895349</c:v>
+                  <c:v>1.25805978398953E6</c:v>
                 </c:pt>
                 <c:pt idx="16">
-                  <c:v>1263955.5833968553</c:v>
+                  <c:v>1.26395558339686E6</c:v>
                 </c:pt>
                 <c:pt idx="17">
-                  <c:v>1262862.7049973886</c:v>
+                  <c:v>1.26286270499739E6</c:v>
                 </c:pt>
                 <c:pt idx="18">
-                  <c:v>1075911.3969311579</c:v>
+                  <c:v>1.07591139693116E6</c:v>
                 </c:pt>
                 <c:pt idx="19">
-                  <c:v>1054596.0945437143</c:v>
+                  <c:v>1.05459609454371E6</c:v>
                 </c:pt>
                 <c:pt idx="20">
-                  <c:v>1067171.5850391591</c:v>
+                  <c:v>1.06717158503916E6</c:v>
                 </c:pt>
                 <c:pt idx="21">
-                  <c:v>793183.64845559327</c:v>
+                  <c:v>793183.6484555935</c:v>
                 </c:pt>
                 <c:pt idx="22">
-                  <c:v>1110760.6861957784</c:v>
+                  <c:v>1.11076068619578E6</c:v>
                 </c:pt>
                 <c:pt idx="23">
-                  <c:v>1224018.9256973602</c:v>
+                  <c:v>1.22401892569736E6</c:v>
                 </c:pt>
                 <c:pt idx="24">
                   <c:v>523405.9292003992</c:v>
                 </c:pt>
                 <c:pt idx="25">
-                  <c:v>1222528.3914522419</c:v>
+                  <c:v>1.22252839145224E6</c:v>
                 </c:pt>
                 <c:pt idx="26">
-                  <c:v>1527013.170105017</c:v>
+                  <c:v>1.52701317010502E6</c:v>
                 </c:pt>
                 <c:pt idx="27">
-                  <c:v>764950.0807548411</c:v>
+                  <c:v>764950.0807548412</c:v>
                 </c:pt>
                 <c:pt idx="28">
-                  <c:v>280075.52560716512</c:v>
+                  <c:v>280075.5256071651</c:v>
                 </c:pt>
                 <c:pt idx="29">
-                  <c:v>198319.44171210684</c:v>
+                  <c:v>198319.4417121068</c:v>
                 </c:pt>
                 <c:pt idx="30">
-                  <c:v>746115.56773623102</c:v>
+                  <c:v>746115.567736231</c:v>
                 </c:pt>
                 <c:pt idx="31">
-                  <c:v>628478.38721178507</c:v>
+                  <c:v>628478.3872117851</c:v>
                 </c:pt>
                 <c:pt idx="32">
-                  <c:v>837280.39205723617</c:v>
+                  <c:v>837280.3920572364</c:v>
                 </c:pt>
                 <c:pt idx="33">
-                  <c:v>879640.93167982274</c:v>
+                  <c:v>879640.9316798227</c:v>
                 </c:pt>
                 <c:pt idx="34">
-                  <c:v>748917.75848824694</c:v>
+                  <c:v>748917.758488247</c:v>
                 </c:pt>
                 <c:pt idx="35">
-                  <c:v>798696.97452041833</c:v>
+                  <c:v>798696.9745204183</c:v>
                 </c:pt>
                 <c:pt idx="36">
-                  <c:v>1134679.3104032569</c:v>
+                  <c:v>1.13467931040326E6</c:v>
                 </c:pt>
                 <c:pt idx="37">
-                  <c:v>1211073.6167813879</c:v>
+                  <c:v>1.21107361678139E6</c:v>
                 </c:pt>
                 <c:pt idx="38">
-                  <c:v>715110.73254303273</c:v>
+                  <c:v>715110.7325430326</c:v>
                 </c:pt>
                 <c:pt idx="39">
-                  <c:v>548515.60114105395</c:v>
+                  <c:v>548515.6011410538</c:v>
                 </c:pt>
                 <c:pt idx="40">
-                  <c:v>1274227.5103098948</c:v>
+                  <c:v>1.27422751030989E6</c:v>
                 </c:pt>
                 <c:pt idx="41">
-                  <c:v>1169645.3179291929</c:v>
+                  <c:v>1.16964531792919E6</c:v>
                 </c:pt>
                 <c:pt idx="42">
-                  <c:v>1050863.3519098638</c:v>
+                  <c:v>1.05086335190986E6</c:v>
                 </c:pt>
                 <c:pt idx="43">
-                  <c:v>1022667.3388923046</c:v>
+                  <c:v>1.0226673388923E6</c:v>
                 </c:pt>
                 <c:pt idx="44">
-                  <c:v>1265811.3251839818</c:v>
+                  <c:v>1.26581132518398E6</c:v>
                 </c:pt>
                 <c:pt idx="45">
-                  <c:v>1106841.9657620806</c:v>
+                  <c:v>1.10684196576208E6</c:v>
                 </c:pt>
                 <c:pt idx="46">
-                  <c:v>395829.85498952173</c:v>
+                  <c:v>395829.8549895218</c:v>
                 </c:pt>
                 <c:pt idx="47">
-                  <c:v>458700.25692733721</c:v>
+                  <c:v>458700.2569273371</c:v>
                 </c:pt>
                 <c:pt idx="48">
-                  <c:v>638168.55844930175</c:v>
+                  <c:v>638168.5584493017</c:v>
                 </c:pt>
                 <c:pt idx="49">
-                  <c:v>570936.55151365674</c:v>
+                  <c:v>570936.5515136567</c:v>
                 </c:pt>
                 <c:pt idx="50">
-                  <c:v>566615.04527070839</c:v>
+                  <c:v>566615.0452707085</c:v>
                 </c:pt>
                 <c:pt idx="51">
-                  <c:v>1075138.2390845658</c:v>
+                  <c:v>1.07513823908457E6</c:v>
                 </c:pt>
                 <c:pt idx="52">
-                  <c:v>432451.69607804803</c:v>
+                  <c:v>432451.696078048</c:v>
                 </c:pt>
                 <c:pt idx="53">
-                  <c:v>872029.91883848002</c:v>
+                  <c:v>872029.91883848</c:v>
                 </c:pt>
                 <c:pt idx="54">
-                  <c:v>840911.50471348024</c:v>
+                  <c:v>840911.5047134801</c:v>
                 </c:pt>
                 <c:pt idx="55">
-                  <c:v>532460.25249140372</c:v>
+                  <c:v>532460.2524914037</c:v>
                 </c:pt>
                 <c:pt idx="56">
-                  <c:v>295420.14807282877</c:v>
+                  <c:v>295420.1480728287</c:v>
                 </c:pt>
                 <c:pt idx="57">
                   <c:v>147057.69812851</c:v>
                 </c:pt>
                 <c:pt idx="58">
-                  <c:v>948481.97218239028</c:v>
+                  <c:v>948481.9721823903</c:v>
                 </c:pt>
                 <c:pt idx="59">
-                  <c:v>1090574.6826456999</c:v>
+                  <c:v>1.0905746826457E6</c:v>
                 </c:pt>
                 <c:pt idx="60">
-                  <c:v>864369.28006722464</c:v>
+                  <c:v>864369.2800672245</c:v>
                 </c:pt>
                 <c:pt idx="61">
-                  <c:v>830361.41206357372</c:v>
+                  <c:v>830361.4120635737</c:v>
                 </c:pt>
                 <c:pt idx="62">
-                  <c:v>744127.07695505361</c:v>
+                  <c:v>744127.0769550536</c:v>
                 </c:pt>
                 <c:pt idx="63">
-                  <c:v>673474.56649763009</c:v>
+                  <c:v>673474.5664976303</c:v>
                 </c:pt>
                 <c:pt idx="64">
-                  <c:v>938216.40128371248</c:v>
+                  <c:v>938216.4012837125</c:v>
                 </c:pt>
                 <c:pt idx="65">
-                  <c:v>1272383.3772974759</c:v>
+                  <c:v>1.27238337729748E6</c:v>
                 </c:pt>
                 <c:pt idx="66">
-                  <c:v>1254126.5967533919</c:v>
+                  <c:v>1.25412659675339E6</c:v>
                 </c:pt>
                 <c:pt idx="67">
-                  <c:v>1336162.9848631476</c:v>
+                  <c:v>1.33616298486315E6</c:v>
                 </c:pt>
                 <c:pt idx="68">
-                  <c:v>1293499.5945370623</c:v>
+                  <c:v>1.29349959453706E6</c:v>
                 </c:pt>
                 <c:pt idx="69">
-                  <c:v>609083.91215907014</c:v>
+                  <c:v>609083.91215907</c:v>
                 </c:pt>
                 <c:pt idx="70">
-                  <c:v>389746.37306409603</c:v>
+                  <c:v>389746.373064096</c:v>
                 </c:pt>
                 <c:pt idx="71">
-                  <c:v>977317.25611816545</c:v>
+                  <c:v>977317.2561181652</c:v>
                 </c:pt>
                 <c:pt idx="72">
-                  <c:v>750040.17977009702</c:v>
+                  <c:v>750040.1797700968</c:v>
                 </c:pt>
                 <c:pt idx="73">
-                  <c:v>643407.88195696706</c:v>
+                  <c:v>643407.8819569671</c:v>
                 </c:pt>
                 <c:pt idx="74">
-                  <c:v>555758.93288470735</c:v>
+                  <c:v>555758.9328847074</c:v>
                 </c:pt>
                 <c:pt idx="75">
-                  <c:v>641478.70987563243</c:v>
+                  <c:v>641478.7098756323</c:v>
                 </c:pt>
                 <c:pt idx="76">
-                  <c:v>1467847.7428543579</c:v>
+                  <c:v>1.46784774285436E6</c:v>
                 </c:pt>
                 <c:pt idx="77">
-                  <c:v>382418.54865400703</c:v>
+                  <c:v>382418.548654007</c:v>
                 </c:pt>
                 <c:pt idx="78">
-                  <c:v>1012354.552200564</c:v>
+                  <c:v>1.01235455220056E6</c:v>
                 </c:pt>
                 <c:pt idx="79">
                   <c:v>826914.518141523</c:v>
@@ -1175,187 +1175,187 @@
                   <c:v>921723.698753912</c:v>
                 </c:pt>
                 <c:pt idx="81">
-                  <c:v>968619.54985716043</c:v>
+                  <c:v>968619.5498571604</c:v>
                 </c:pt>
                 <c:pt idx="82">
-                  <c:v>1018691.2247806879</c:v>
+                  <c:v>1.01869122478069E6</c:v>
                 </c:pt>
                 <c:pt idx="83">
-                  <c:v>960654.46212047967</c:v>
+                  <c:v>960654.4621204797</c:v>
                 </c:pt>
                 <c:pt idx="84">
-                  <c:v>203449.95732390255</c:v>
+                  <c:v>203449.9573239026</c:v>
                 </c:pt>
                 <c:pt idx="85">
-                  <c:v>612966.33753753826</c:v>
+                  <c:v>612966.3375375384</c:v>
                 </c:pt>
                 <c:pt idx="86">
-                  <c:v>489227.17397198325</c:v>
+                  <c:v>489227.1739719833</c:v>
                 </c:pt>
                 <c:pt idx="87">
-                  <c:v>414246.05646214786</c:v>
+                  <c:v>414246.0564621479</c:v>
                 </c:pt>
                 <c:pt idx="88">
-                  <c:v>1199127.0790072498</c:v>
+                  <c:v>1.19912707900725E6</c:v>
                 </c:pt>
                 <c:pt idx="89">
-                  <c:v>1087145.9245854737</c:v>
+                  <c:v>1.08714592458547E6</c:v>
                 </c:pt>
                 <c:pt idx="90">
-                  <c:v>1284207.688550845</c:v>
+                  <c:v>1.28420768855085E6</c:v>
                 </c:pt>
                 <c:pt idx="91">
-                  <c:v>1097237.1542002128</c:v>
+                  <c:v>1.09723715420021E6</c:v>
                 </c:pt>
                 <c:pt idx="92">
-                  <c:v>860786.78690904216</c:v>
+                  <c:v>860786.7869090422</c:v>
                 </c:pt>
                 <c:pt idx="93">
-                  <c:v>1024680.2830124879</c:v>
+                  <c:v>1.02468028301249E6</c:v>
                 </c:pt>
                 <c:pt idx="94">
-                  <c:v>874796.26254482591</c:v>
+                  <c:v>874796.262544826</c:v>
                 </c:pt>
                 <c:pt idx="95">
-                  <c:v>746178.99733336584</c:v>
+                  <c:v>746178.9973333657</c:v>
                 </c:pt>
                 <c:pt idx="96">
-                  <c:v>654094.10380630917</c:v>
+                  <c:v>654094.1038063092</c:v>
                 </c:pt>
                 <c:pt idx="97">
-                  <c:v>1377692.0744937744</c:v>
+                  <c:v>1.37769207449377E6</c:v>
                 </c:pt>
                 <c:pt idx="98">
-                  <c:v>1336545.6422930134</c:v>
+                  <c:v>1.33654564229301E6</c:v>
                 </c:pt>
                 <c:pt idx="99">
-                  <c:v>1429400.2566191659</c:v>
+                  <c:v>1.42940025661917E6</c:v>
                 </c:pt>
                 <c:pt idx="100">
-                  <c:v>1284524.7824720191</c:v>
+                  <c:v>1.28452478247202E6</c:v>
                 </c:pt>
                 <c:pt idx="101">
-                  <c:v>535577.56851894059</c:v>
+                  <c:v>535577.5685189406</c:v>
                 </c:pt>
                 <c:pt idx="102">
-                  <c:v>605019.66890479682</c:v>
+                  <c:v>605019.668904797</c:v>
                 </c:pt>
                 <c:pt idx="103">
-                  <c:v>182273.67130074193</c:v>
+                  <c:v>182273.6713007419</c:v>
                 </c:pt>
                 <c:pt idx="104">
-                  <c:v>135217.68816491953</c:v>
+                  <c:v>135217.6881649195</c:v>
                 </c:pt>
                 <c:pt idx="105">
-                  <c:v>497882.15999407478</c:v>
+                  <c:v>497882.1599940747</c:v>
                 </c:pt>
                 <c:pt idx="106">
-                  <c:v>493734.96663219493</c:v>
+                  <c:v>493734.966632195</c:v>
                 </c:pt>
                 <c:pt idx="107">
-                  <c:v>400444.78378502047</c:v>
+                  <c:v>400444.7837850205</c:v>
                 </c:pt>
                 <c:pt idx="108">
-                  <c:v>380177.13656651269</c:v>
+                  <c:v>380177.1365665127</c:v>
                 </c:pt>
                 <c:pt idx="109">
-                  <c:v>523341.45282182726</c:v>
+                  <c:v>523341.4528218272</c:v>
                 </c:pt>
                 <c:pt idx="110">
                   <c:v>109988.2767458466</c:v>
                 </c:pt>
                 <c:pt idx="111">
-                  <c:v>122306.94328776696</c:v>
+                  <c:v>122306.9432877669</c:v>
                 </c:pt>
                 <c:pt idx="112">
-                  <c:v>1150212.8890723425</c:v>
+                  <c:v>1.15021288907234E6</c:v>
                 </c:pt>
                 <c:pt idx="113">
-                  <c:v>1018907.1555377094</c:v>
+                  <c:v>1.01890715553771E6</c:v>
                 </c:pt>
                 <c:pt idx="114">
-                  <c:v>1233617.7031831054</c:v>
+                  <c:v>1.23361770318311E6</c:v>
                 </c:pt>
                 <c:pt idx="115">
-                  <c:v>1082958.5578898522</c:v>
+                  <c:v>1.08295855788985E6</c:v>
                 </c:pt>
                 <c:pt idx="116">
-                  <c:v>767725.22351796168</c:v>
+                  <c:v>767725.2235179617</c:v>
                 </c:pt>
                 <c:pt idx="117">
-                  <c:v>951902.27980920067</c:v>
+                  <c:v>951902.2798092006</c:v>
                 </c:pt>
                 <c:pt idx="118">
                   <c:v>973989.0772271757</c:v>
                 </c:pt>
                 <c:pt idx="119">
-                  <c:v>983385.34039376187</c:v>
+                  <c:v>983385.340393762</c:v>
                 </c:pt>
                 <c:pt idx="120">
-                  <c:v>40716.654973618817</c:v>
+                  <c:v>40716.65497361882</c:v>
                 </c:pt>
                 <c:pt idx="121">
-                  <c:v>491207.80398080888</c:v>
+                  <c:v>491207.8039808089</c:v>
                 </c:pt>
                 <c:pt idx="122">
-                  <c:v>527797.28357154457</c:v>
+                  <c:v>527797.2835715445</c:v>
                 </c:pt>
                 <c:pt idx="123">
-                  <c:v>285791.56190861802</c:v>
+                  <c:v>285791.561908618</c:v>
                 </c:pt>
                 <c:pt idx="124">
-                  <c:v>554782.83169444313</c:v>
+                  <c:v>554782.8316944433</c:v>
                 </c:pt>
                 <c:pt idx="125">
                   <c:v>575955.8271113293</c:v>
                 </c:pt>
                 <c:pt idx="126">
-                  <c:v>329904.70251505042</c:v>
+                  <c:v>329904.7025150504</c:v>
                 </c:pt>
                 <c:pt idx="127">
-                  <c:v>183126.66361918903</c:v>
+                  <c:v>183126.663619189</c:v>
                 </c:pt>
                 <c:pt idx="128">
-                  <c:v>716284.25452772481</c:v>
+                  <c:v>716284.2545277248</c:v>
                 </c:pt>
                 <c:pt idx="129">
-                  <c:v>671083.27730444481</c:v>
+                  <c:v>671083.2773044447</c:v>
                 </c:pt>
                 <c:pt idx="130">
-                  <c:v>806202.41868933744</c:v>
+                  <c:v>806202.4186893374</c:v>
                 </c:pt>
                 <c:pt idx="131">
-                  <c:v>748848.1707350947</c:v>
+                  <c:v>748848.1707350946</c:v>
                 </c:pt>
                 <c:pt idx="132">
-                  <c:v>906668.87291011028</c:v>
+                  <c:v>906668.8729101103</c:v>
                 </c:pt>
                 <c:pt idx="133">
-                  <c:v>941664.12470549834</c:v>
+                  <c:v>941664.1247054983</c:v>
                 </c:pt>
                 <c:pt idx="134">
-                  <c:v>1119721.9508255315</c:v>
+                  <c:v>1.11972195082553E6</c:v>
                 </c:pt>
                 <c:pt idx="135">
-                  <c:v>900569.89871321886</c:v>
+                  <c:v>900569.898713219</c:v>
                 </c:pt>
                 <c:pt idx="136">
-                  <c:v>746452.77373917936</c:v>
+                  <c:v>746452.7737391792</c:v>
                 </c:pt>
                 <c:pt idx="137">
-                  <c:v>699394.89401649882</c:v>
+                  <c:v>699394.8940164988</c:v>
                 </c:pt>
                 <c:pt idx="138">
-                  <c:v>725216.3213076361</c:v>
+                  <c:v>725216.3213076363</c:v>
                 </c:pt>
                 <c:pt idx="139">
-                  <c:v>940594.53890472359</c:v>
+                  <c:v>940594.5389047237</c:v>
                 </c:pt>
                 <c:pt idx="140">
-                  <c:v>736270.50671100942</c:v>
+                  <c:v>736270.5067110093</c:v>
                 </c:pt>
                 <c:pt idx="141">
-                  <c:v>517408.14185538702</c:v>
+                  <c:v>517408.1418553868</c:v>
                 </c:pt>
                 <c:pt idx="142">
                   <c:v>456398.7874808223</c:v>
@@ -1364,247 +1364,247 @@
                   <c:v>469726.455279421</c:v>
                 </c:pt>
                 <c:pt idx="144">
-                  <c:v>719645.53058566316</c:v>
+                  <c:v>719645.5305856632</c:v>
                 </c:pt>
                 <c:pt idx="145">
-                  <c:v>423735.92598539073</c:v>
+                  <c:v>423735.9259853908</c:v>
                 </c:pt>
                 <c:pt idx="146">
-                  <c:v>470042.64842630416</c:v>
+                  <c:v>470042.6484263041</c:v>
                 </c:pt>
                 <c:pt idx="147">
-                  <c:v>347866.79829527263</c:v>
+                  <c:v>347866.7982952726</c:v>
                 </c:pt>
                 <c:pt idx="148">
-                  <c:v>354398.33801699796</c:v>
+                  <c:v>354398.3380169979</c:v>
                 </c:pt>
                 <c:pt idx="149">
-                  <c:v>341800.51628272654</c:v>
+                  <c:v>341800.5162827266</c:v>
                 </c:pt>
                 <c:pt idx="150">
-                  <c:v>349614.23813714436</c:v>
+                  <c:v>349614.2381371444</c:v>
                 </c:pt>
                 <c:pt idx="151">
-                  <c:v>234785.37759796641</c:v>
+                  <c:v>234785.3775979664</c:v>
                 </c:pt>
                 <c:pt idx="152">
-                  <c:v>348894.56667335646</c:v>
+                  <c:v>348894.5666733565</c:v>
                 </c:pt>
                 <c:pt idx="153">
-                  <c:v>486681.27463428961</c:v>
+                  <c:v>486681.2746342896</c:v>
                 </c:pt>
                 <c:pt idx="154">
-                  <c:v>1408412.0275353948</c:v>
+                  <c:v>1.40841202753539E6</c:v>
                 </c:pt>
                 <c:pt idx="155">
-                  <c:v>1319657.2059190318</c:v>
+                  <c:v>1.31965720591903E6</c:v>
                 </c:pt>
                 <c:pt idx="156">
-                  <c:v>927364.30041256058</c:v>
+                  <c:v>927364.3004125606</c:v>
                 </c:pt>
                 <c:pt idx="157">
-                  <c:v>1123538.2586322108</c:v>
+                  <c:v>1.12353825863221E6</c:v>
                 </c:pt>
                 <c:pt idx="158">
-                  <c:v>803727.85106692696</c:v>
+                  <c:v>803727.8510669273</c:v>
                 </c:pt>
                 <c:pt idx="159">
-                  <c:v>788156.09195782163</c:v>
+                  <c:v>788156.0919578217</c:v>
                 </c:pt>
                 <c:pt idx="160">
-                  <c:v>817642.11905045318</c:v>
+                  <c:v>817642.1190504532</c:v>
                 </c:pt>
                 <c:pt idx="161">
-                  <c:v>1288409.4333090368</c:v>
+                  <c:v>1.28840943330904E6</c:v>
                 </c:pt>
                 <c:pt idx="162">
-                  <c:v>949501.14638707647</c:v>
+                  <c:v>949501.1463870765</c:v>
                 </c:pt>
                 <c:pt idx="163">
-                  <c:v>1255753.1538629336</c:v>
+                  <c:v>1.25575315386293E6</c:v>
                 </c:pt>
                 <c:pt idx="164">
-                  <c:v>1047734.5052383078</c:v>
+                  <c:v>1.04773450523831E6</c:v>
                 </c:pt>
                 <c:pt idx="165">
-                  <c:v>896774.36575664801</c:v>
+                  <c:v>896774.365756648</c:v>
                 </c:pt>
                 <c:pt idx="166">
-                  <c:v>1164672.0647146727</c:v>
+                  <c:v>1.16467206471467E6</c:v>
                 </c:pt>
                 <c:pt idx="167">
-                  <c:v>219654.38492538294</c:v>
+                  <c:v>219654.3849253829</c:v>
                 </c:pt>
                 <c:pt idx="168">
-                  <c:v>199199.36435411795</c:v>
+                  <c:v>199199.364354118</c:v>
                 </c:pt>
                 <c:pt idx="169">
-                  <c:v>136977.40175587119</c:v>
+                  <c:v>136977.4017558712</c:v>
                 </c:pt>
                 <c:pt idx="170">
-                  <c:v>1065746.7308163045</c:v>
+                  <c:v>1.0657467308163E6</c:v>
                 </c:pt>
                 <c:pt idx="171">
-                  <c:v>980602.05423562997</c:v>
+                  <c:v>980602.05423563</c:v>
                 </c:pt>
                 <c:pt idx="172">
-                  <c:v>843206.33632729354</c:v>
+                  <c:v>843206.3363272936</c:v>
                 </c:pt>
                 <c:pt idx="173">
-                  <c:v>1029932.1459860139</c:v>
+                  <c:v>1.02993214598601E6</c:v>
                 </c:pt>
                 <c:pt idx="174">
-                  <c:v>434282.06414295529</c:v>
+                  <c:v>434282.0641429553</c:v>
                 </c:pt>
                 <c:pt idx="175">
-                  <c:v>978941.65678787697</c:v>
+                  <c:v>978941.6567878772</c:v>
                 </c:pt>
                 <c:pt idx="176">
-                  <c:v>924309.90708540962</c:v>
+                  <c:v>924309.9070854096</c:v>
                 </c:pt>
                 <c:pt idx="177">
-                  <c:v>1052406.5239857049</c:v>
+                  <c:v>1.0524065239857E6</c:v>
                 </c:pt>
                 <c:pt idx="178">
-                  <c:v>736007.83151938871</c:v>
+                  <c:v>736007.8315193887</c:v>
                 </c:pt>
                 <c:pt idx="179">
-                  <c:v>478364.12881064886</c:v>
+                  <c:v>478364.1288106488</c:v>
                 </c:pt>
                 <c:pt idx="180">
-                  <c:v>322056.66938317148</c:v>
+                  <c:v>322056.6693831715</c:v>
                 </c:pt>
                 <c:pt idx="181">
-                  <c:v>893428.00067013642</c:v>
+                  <c:v>893428.0006701364</c:v>
                 </c:pt>
                 <c:pt idx="182">
-                  <c:v>1341872.1696311713</c:v>
+                  <c:v>1.34187216963117E6</c:v>
                 </c:pt>
                 <c:pt idx="183">
-                  <c:v>605048.71556672582</c:v>
+                  <c:v>605048.7155667258</c:v>
                 </c:pt>
                 <c:pt idx="184">
-                  <c:v>508622.58173610416</c:v>
+                  <c:v>508622.5817361042</c:v>
                 </c:pt>
                 <c:pt idx="185">
-                  <c:v>900067.96110063139</c:v>
+                  <c:v>900067.9611006316</c:v>
                 </c:pt>
                 <c:pt idx="186">
-                  <c:v>756029.12165329116</c:v>
+                  <c:v>756029.1216532913</c:v>
                 </c:pt>
                 <c:pt idx="187">
-                  <c:v>1238982.6396903251</c:v>
+                  <c:v>1.23898263969032E6</c:v>
                 </c:pt>
                 <c:pt idx="188">
-                  <c:v>1072843.799824744</c:v>
+                  <c:v>1.07284379982474E6</c:v>
                 </c:pt>
                 <c:pt idx="189">
-                  <c:v>1093439.1106215543</c:v>
+                  <c:v>1.09343911062155E6</c:v>
                 </c:pt>
                 <c:pt idx="190">
                   <c:v>517211.525257178</c:v>
                 </c:pt>
                 <c:pt idx="191">
-                  <c:v>282663.59278335434</c:v>
+                  <c:v>282663.5927833544</c:v>
                 </c:pt>
                 <c:pt idx="192">
-                  <c:v>234148.64544019339</c:v>
+                  <c:v>234148.6454401934</c:v>
                 </c:pt>
                 <c:pt idx="193">
-                  <c:v>239224.84309211679</c:v>
+                  <c:v>239224.8430921168</c:v>
                 </c:pt>
                 <c:pt idx="194">
-                  <c:v>918414.02959658916</c:v>
+                  <c:v>918414.0295965892</c:v>
                 </c:pt>
                 <c:pt idx="195">
-                  <c:v>902402.55867889326</c:v>
+                  <c:v>902402.5586788933</c:v>
                 </c:pt>
                 <c:pt idx="196">
-                  <c:v>1016525.3036394549</c:v>
+                  <c:v>1.01652530363945E6</c:v>
                 </c:pt>
                 <c:pt idx="197">
-                  <c:v>1097943.2020044469</c:v>
+                  <c:v>1.09794320200445E6</c:v>
                 </c:pt>
                 <c:pt idx="198">
                   <c:v>517771.4053639053</c:v>
                 </c:pt>
                 <c:pt idx="199">
-                  <c:v>488152.70636008552</c:v>
+                  <c:v>488152.7063600855</c:v>
                 </c:pt>
                 <c:pt idx="200">
-                  <c:v>626688.73434956442</c:v>
+                  <c:v>626688.7343495641</c:v>
                 </c:pt>
                 <c:pt idx="201">
-                  <c:v>133146.21808841388</c:v>
+                  <c:v>133146.218088414</c:v>
                 </c:pt>
                 <c:pt idx="202">
-                  <c:v>184650.04122252623</c:v>
+                  <c:v>184650.0412225262</c:v>
                 </c:pt>
                 <c:pt idx="203">
-                  <c:v>140938.18716903214</c:v>
+                  <c:v>140938.1871690321</c:v>
                 </c:pt>
                 <c:pt idx="204">
-                  <c:v>705283.84900300927</c:v>
+                  <c:v>705283.8490030093</c:v>
                 </c:pt>
                 <c:pt idx="205">
-                  <c:v>359078.1416487199</c:v>
+                  <c:v>359078.14164872</c:v>
                 </c:pt>
                 <c:pt idx="206">
-                  <c:v>213579.01311664539</c:v>
+                  <c:v>213579.0131166454</c:v>
                 </c:pt>
                 <c:pt idx="207">
-                  <c:v>240457.91252554193</c:v>
+                  <c:v>240457.9125255419</c:v>
                 </c:pt>
                 <c:pt idx="208">
-                  <c:v>82860.687610082125</c:v>
+                  <c:v>82860.68761008212</c:v>
                 </c:pt>
                 <c:pt idx="209">
-                  <c:v>84485.566709818362</c:v>
+                  <c:v>84485.56670981836</c:v>
                 </c:pt>
                 <c:pt idx="210">
-                  <c:v>1080957.6091686594</c:v>
+                  <c:v>1.08095760916866E6</c:v>
                 </c:pt>
                 <c:pt idx="211">
-                  <c:v>1499888.3717334429</c:v>
+                  <c:v>1.49988837173344E6</c:v>
                 </c:pt>
                 <c:pt idx="212">
-                  <c:v>918666.9968233871</c:v>
+                  <c:v>918666.9968233872</c:v>
                 </c:pt>
                 <c:pt idx="213">
-                  <c:v>933888.32431361999</c:v>
+                  <c:v>933888.32431362</c:v>
                 </c:pt>
                 <c:pt idx="214">
-                  <c:v>777462.03705859708</c:v>
+                  <c:v>777462.0370585971</c:v>
                 </c:pt>
                 <c:pt idx="215">
-                  <c:v>749830.73748125369</c:v>
+                  <c:v>749830.7374812537</c:v>
                 </c:pt>
                 <c:pt idx="216">
-                  <c:v>1498231.9767015087</c:v>
+                  <c:v>1.49823197670151E6</c:v>
                 </c:pt>
                 <c:pt idx="217">
-                  <c:v>671074.50083014846</c:v>
+                  <c:v>671074.5008301485</c:v>
                 </c:pt>
                 <c:pt idx="218">
-                  <c:v>836773.48988904618</c:v>
+                  <c:v>836773.4898890462</c:v>
                 </c:pt>
                 <c:pt idx="219">
-                  <c:v>1212371.7711329793</c:v>
+                  <c:v>1.21237177113298E6</c:v>
                 </c:pt>
                 <c:pt idx="220">
-                  <c:v>1194248.2781570547</c:v>
+                  <c:v>1.19424827815705E6</c:v>
                 </c:pt>
                 <c:pt idx="221">
-                  <c:v>1432423.8196649607</c:v>
+                  <c:v>1.43242381966496E6</c:v>
                 </c:pt>
                 <c:pt idx="222">
-                  <c:v>1378955.8444972136</c:v>
+                  <c:v>1.37895584449721E6</c:v>
                 </c:pt>
                 <c:pt idx="223">
-                  <c:v>1367146.1850593633</c:v>
+                  <c:v>1.36714618505936E6</c:v>
                 </c:pt>
                 <c:pt idx="224">
-                  <c:v>1333633.790362556</c:v>
+                  <c:v>1.33363379036256E6</c:v>
                 </c:pt>
               </c:numCache>
             </c:numRef>
@@ -1619,15 +1619,15 @@
           <c:showPercent val="0"/>
           <c:showBubbleSize val="0"/>
         </c:dLbls>
-        <c:axId val="254818216"/>
-        <c:axId val="254816648"/>
+        <c:axId val="1698415936"/>
+        <c:axId val="1698416464"/>
       </c:scatterChart>
       <c:valAx>
-        <c:axId val="254818216"/>
+        <c:axId val="1698415936"/>
         <c:scaling>
           <c:orientation val="minMax"/>
-          <c:max val="1600000"/>
-          <c:min val="0"/>
+          <c:max val="1.6E6"/>
+          <c:min val="0.0"/>
         </c:scaling>
         <c:delete val="0"/>
         <c:axPos val="b"/>
@@ -1652,7 +1652,7 @@
               <a:lstStyle/>
               <a:p>
                 <a:pPr>
-                  <a:defRPr sz="1330" b="0" i="0" u="none" strike="noStrike" kern="1200" baseline="0">
+                  <a:defRPr lang="ja-JP" sz="1330" b="0" i="0" u="none" strike="noStrike" kern="1200" baseline="0">
                     <a:solidFill>
                       <a:schemeClr val="tx1">
                         <a:lumMod val="65000"/>
@@ -1676,8 +1676,8 @@
             <c:manualLayout>
               <c:xMode val="edge"/>
               <c:yMode val="edge"/>
-              <c:x val="0.51296370570866145"/>
-              <c:y val="0.95722824250929028"/>
+              <c:x val="0.512963705708661"/>
+              <c:y val="0.95722824250929"/>
             </c:manualLayout>
           </c:layout>
           <c:overlay val="0"/>
@@ -1693,7 +1693,7 @@
             <a:lstStyle/>
             <a:p>
               <a:pPr>
-                <a:defRPr sz="1330" b="0" i="0" u="none" strike="noStrike" kern="1200" baseline="0">
+                <a:defRPr lang="ja-JP" sz="1330" b="0" i="0" u="none" strike="noStrike" kern="1200" baseline="0">
                   <a:solidFill>
                     <a:schemeClr val="tx1">
                       <a:lumMod val="65000"/>
@@ -1705,7 +1705,7 @@
                   <a:cs typeface="+mn-cs"/>
                 </a:defRPr>
               </a:pPr>
-              <a:endParaRPr lang="ja-JP"/>
+              <a:endParaRPr lang="en-US"/>
             </a:p>
           </c:txPr>
         </c:title>
@@ -1731,7 +1731,7 @@
           <a:lstStyle/>
           <a:p>
             <a:pPr>
-              <a:defRPr sz="1197" b="0" i="0" u="none" strike="noStrike" kern="1200" baseline="0">
+              <a:defRPr lang="ja-JP" sz="1197" b="0" i="0" u="none" strike="noStrike" kern="1200" baseline="0">
                 <a:solidFill>
                   <a:schemeClr val="tx1">
                     <a:lumMod val="65000"/>
@@ -1743,21 +1743,21 @@
                 <a:cs typeface="+mn-cs"/>
               </a:defRPr>
             </a:pPr>
-            <a:endParaRPr lang="ja-JP"/>
+            <a:endParaRPr lang="en-US"/>
           </a:p>
         </c:txPr>
-        <c:crossAx val="254816648"/>
+        <c:crossAx val="1698416464"/>
         <c:crosses val="autoZero"/>
         <c:crossBetween val="midCat"/>
-        <c:majorUnit val="200000"/>
-        <c:minorUnit val="40000"/>
+        <c:majorUnit val="200000.0"/>
+        <c:minorUnit val="40000.0"/>
       </c:valAx>
       <c:valAx>
-        <c:axId val="254816648"/>
+        <c:axId val="1698416464"/>
         <c:scaling>
           <c:orientation val="minMax"/>
-          <c:max val="1600000"/>
-          <c:min val="0"/>
+          <c:max val="1.6E6"/>
+          <c:min val="0.0"/>
         </c:scaling>
         <c:delete val="0"/>
         <c:axPos val="l"/>
@@ -1782,7 +1782,7 @@
               <a:lstStyle/>
               <a:p>
                 <a:pPr>
-                  <a:defRPr sz="1330" b="0" i="0" u="none" strike="noStrike" kern="1200" baseline="0">
+                  <a:defRPr lang="ja-JP" sz="1330" b="0" i="0" u="none" strike="noStrike" kern="1200" baseline="0">
                     <a:solidFill>
                       <a:schemeClr val="tx1">
                         <a:lumMod val="65000"/>
@@ -1805,8 +1805,8 @@
             <c:manualLayout>
               <c:xMode val="edge"/>
               <c:yMode val="edge"/>
-              <c:x val="5.46875E-2"/>
-              <c:y val="0.44684243522777473"/>
+              <c:x val="0.0546875"/>
+              <c:y val="0.446842435227775"/>
             </c:manualLayout>
           </c:layout>
           <c:overlay val="0"/>
@@ -1822,7 +1822,7 @@
             <a:lstStyle/>
             <a:p>
               <a:pPr>
-                <a:defRPr sz="1330" b="0" i="0" u="none" strike="noStrike" kern="1200" baseline="0">
+                <a:defRPr lang="ja-JP" sz="1330" b="0" i="0" u="none" strike="noStrike" kern="1200" baseline="0">
                   <a:solidFill>
                     <a:schemeClr val="tx1">
                       <a:lumMod val="65000"/>
@@ -1834,7 +1834,7 @@
                   <a:cs typeface="+mn-cs"/>
                 </a:defRPr>
               </a:pPr>
-              <a:endParaRPr lang="ja-JP"/>
+              <a:endParaRPr lang="en-US"/>
             </a:p>
           </c:txPr>
         </c:title>
@@ -1860,7 +1860,7 @@
           <a:lstStyle/>
           <a:p>
             <a:pPr>
-              <a:defRPr sz="1197" b="0" i="0" u="none" strike="noStrike" kern="1200" baseline="0">
+              <a:defRPr lang="ja-JP" sz="1197" b="0" i="0" u="none" strike="noStrike" kern="1200" baseline="0">
                 <a:solidFill>
                   <a:schemeClr val="tx1">
                     <a:lumMod val="65000"/>
@@ -1872,11 +1872,11 @@
                 <a:cs typeface="+mn-cs"/>
               </a:defRPr>
             </a:pPr>
-            <a:endParaRPr lang="ja-JP"/>
+            <a:endParaRPr lang="en-US"/>
           </a:p>
         </c:txPr>
-        <c:crossAx val="254818216"/>
-        <c:crossesAt val="0"/>
+        <c:crossAx val="1698415936"/>
+        <c:crossesAt val="0.0"/>
         <c:crossBetween val="midCat"/>
       </c:valAx>
       <c:spPr>
@@ -1905,7 +1905,7 @@
       <a:pPr>
         <a:defRPr/>
       </a:pPr>
-      <a:endParaRPr lang="ja-JP"/>
+      <a:endParaRPr lang="en-US"/>
     </a:p>
   </c:txPr>
   <c:externalData r:id="rId3">
@@ -2601,7 +2601,7 @@
           <a:p>
             <a:fld id="{4143EDA5-0746-46F7-B2DE-B885B12C08EB}" type="datetimeFigureOut">
               <a:rPr kumimoji="1" lang="ja-JP" altLang="en-US" smtClean="0"/>
-              <a:t>2017/8/31</a:t>
+              <a:t>2017/9/8</a:t>
             </a:fld>
             <a:endParaRPr kumimoji="1" lang="ja-JP" altLang="en-US"/>
           </a:p>
@@ -2803,7 +2803,7 @@
           <a:p>
             <a:fld id="{4143EDA5-0746-46F7-B2DE-B885B12C08EB}" type="datetimeFigureOut">
               <a:rPr kumimoji="1" lang="ja-JP" altLang="en-US" smtClean="0"/>
-              <a:t>2017/8/31</a:t>
+              <a:t>2017/9/8</a:t>
             </a:fld>
             <a:endParaRPr kumimoji="1" lang="ja-JP" altLang="en-US"/>
           </a:p>
@@ -3015,7 +3015,7 @@
           <a:p>
             <a:fld id="{4143EDA5-0746-46F7-B2DE-B885B12C08EB}" type="datetimeFigureOut">
               <a:rPr kumimoji="1" lang="ja-JP" altLang="en-US" smtClean="0"/>
-              <a:t>2017/8/31</a:t>
+              <a:t>2017/9/8</a:t>
             </a:fld>
             <a:endParaRPr kumimoji="1" lang="ja-JP" altLang="en-US"/>
           </a:p>
@@ -3217,7 +3217,7 @@
           <a:p>
             <a:fld id="{4143EDA5-0746-46F7-B2DE-B885B12C08EB}" type="datetimeFigureOut">
               <a:rPr kumimoji="1" lang="ja-JP" altLang="en-US" smtClean="0"/>
-              <a:t>2017/8/31</a:t>
+              <a:t>2017/9/8</a:t>
             </a:fld>
             <a:endParaRPr kumimoji="1" lang="ja-JP" altLang="en-US"/>
           </a:p>
@@ -3463,7 +3463,7 @@
           <a:p>
             <a:fld id="{4143EDA5-0746-46F7-B2DE-B885B12C08EB}" type="datetimeFigureOut">
               <a:rPr kumimoji="1" lang="ja-JP" altLang="en-US" smtClean="0"/>
-              <a:t>2017/8/31</a:t>
+              <a:t>2017/9/8</a:t>
             </a:fld>
             <a:endParaRPr kumimoji="1" lang="ja-JP" altLang="en-US"/>
           </a:p>
@@ -3759,7 +3759,7 @@
           <a:p>
             <a:fld id="{4143EDA5-0746-46F7-B2DE-B885B12C08EB}" type="datetimeFigureOut">
               <a:rPr kumimoji="1" lang="ja-JP" altLang="en-US" smtClean="0"/>
-              <a:t>2017/8/31</a:t>
+              <a:t>2017/9/8</a:t>
             </a:fld>
             <a:endParaRPr kumimoji="1" lang="ja-JP" altLang="en-US"/>
           </a:p>
@@ -4190,7 +4190,7 @@
           <a:p>
             <a:fld id="{4143EDA5-0746-46F7-B2DE-B885B12C08EB}" type="datetimeFigureOut">
               <a:rPr kumimoji="1" lang="ja-JP" altLang="en-US" smtClean="0"/>
-              <a:t>2017/8/31</a:t>
+              <a:t>2017/9/8</a:t>
             </a:fld>
             <a:endParaRPr kumimoji="1" lang="ja-JP" altLang="en-US"/>
           </a:p>
@@ -4308,7 +4308,7 @@
           <a:p>
             <a:fld id="{4143EDA5-0746-46F7-B2DE-B885B12C08EB}" type="datetimeFigureOut">
               <a:rPr kumimoji="1" lang="ja-JP" altLang="en-US" smtClean="0"/>
-              <a:t>2017/8/31</a:t>
+              <a:t>2017/9/8</a:t>
             </a:fld>
             <a:endParaRPr kumimoji="1" lang="ja-JP" altLang="en-US"/>
           </a:p>
@@ -4403,7 +4403,7 @@
           <a:p>
             <a:fld id="{4143EDA5-0746-46F7-B2DE-B885B12C08EB}" type="datetimeFigureOut">
               <a:rPr kumimoji="1" lang="ja-JP" altLang="en-US" smtClean="0"/>
-              <a:t>2017/8/31</a:t>
+              <a:t>2017/9/8</a:t>
             </a:fld>
             <a:endParaRPr kumimoji="1" lang="ja-JP" altLang="en-US"/>
           </a:p>
@@ -4712,7 +4712,7 @@
           <a:p>
             <a:fld id="{4143EDA5-0746-46F7-B2DE-B885B12C08EB}" type="datetimeFigureOut">
               <a:rPr kumimoji="1" lang="ja-JP" altLang="en-US" smtClean="0"/>
-              <a:t>2017/8/31</a:t>
+              <a:t>2017/9/8</a:t>
             </a:fld>
             <a:endParaRPr kumimoji="1" lang="ja-JP" altLang="en-US"/>
           </a:p>
@@ -4965,7 +4965,7 @@
           <a:p>
             <a:fld id="{4143EDA5-0746-46F7-B2DE-B885B12C08EB}" type="datetimeFigureOut">
               <a:rPr kumimoji="1" lang="ja-JP" altLang="en-US" smtClean="0"/>
-              <a:t>2017/8/31</a:t>
+              <a:t>2017/9/8</a:t>
             </a:fld>
             <a:endParaRPr kumimoji="1" lang="ja-JP" altLang="en-US"/>
           </a:p>
@@ -5210,7 +5210,7 @@
           <a:p>
             <a:fld id="{4143EDA5-0746-46F7-B2DE-B885B12C08EB}" type="datetimeFigureOut">
               <a:rPr kumimoji="1" lang="ja-JP" altLang="en-US" smtClean="0"/>
-              <a:t>2017/8/31</a:t>
+              <a:t>2017/9/8</a:t>
             </a:fld>
             <a:endParaRPr kumimoji="1" lang="ja-JP" altLang="en-US"/>
           </a:p>
@@ -5675,6 +5675,129 @@
           </a:p>
         </p:txBody>
       </p:sp>
+      <p:sp>
+        <p:nvSpPr>
+          <p:cNvPr id="4" name="テキスト ボックス 1"/>
+          <p:cNvSpPr txBox="1"/>
+          <p:nvPr/>
+        </p:nvSpPr>
+        <p:spPr>
+          <a:xfrm>
+            <a:off x="8050895" y="3725357"/>
+            <a:ext cx="3143809" cy="2677656"/>
+          </a:xfrm>
+          <a:prstGeom prst="rect">
+            <a:avLst/>
+          </a:prstGeom>
+          <a:noFill/>
+        </p:spPr>
+        <p:txBody>
+          <a:bodyPr wrap="none" rtlCol="0">
+            <a:spAutoFit/>
+          </a:bodyPr>
+          <a:lstStyle/>
+          <a:p>
+            <a:r>
+              <a:rPr lang="ja-JP" altLang="en-US" sz="2400" dirty="0" smtClean="0">
+                <a:solidFill>
+                  <a:srgbClr val="FF0000"/>
+                </a:solidFill>
+              </a:rPr>
+              <a:t>いいっすね～。</a:t>
+            </a:r>
+            <a:endParaRPr lang="en-US" altLang="ja-JP" sz="2400" dirty="0" smtClean="0">
+              <a:solidFill>
+                <a:srgbClr val="FF0000"/>
+              </a:solidFill>
+            </a:endParaRPr>
+          </a:p>
+          <a:p>
+            <a:r>
+              <a:rPr lang="ja-JP" altLang="en-US" sz="2400" dirty="0" smtClean="0">
+                <a:solidFill>
+                  <a:srgbClr val="FF0000"/>
+                </a:solidFill>
+              </a:rPr>
+              <a:t>個人的に</a:t>
+            </a:r>
+            <a:r>
+              <a:rPr lang="en-US" altLang="ja-JP" sz="2400" dirty="0" smtClean="0">
+                <a:solidFill>
+                  <a:srgbClr val="FF0000"/>
+                </a:solidFill>
+              </a:rPr>
+              <a:t>grid off</a:t>
+            </a:r>
+          </a:p>
+          <a:p>
+            <a:r>
+              <a:rPr kumimoji="1" lang="ja-JP" altLang="en-US" sz="2400" dirty="0" smtClean="0">
+                <a:solidFill>
+                  <a:srgbClr val="FF0000"/>
+                </a:solidFill>
+              </a:rPr>
+              <a:t>が好きですけど（笑）</a:t>
+            </a:r>
+            <a:endParaRPr kumimoji="1" lang="en-US" altLang="ja-JP" sz="2400" dirty="0" smtClean="0">
+              <a:solidFill>
+                <a:srgbClr val="FF0000"/>
+              </a:solidFill>
+            </a:endParaRPr>
+          </a:p>
+          <a:p>
+            <a:endParaRPr lang="en-US" altLang="ja-JP" sz="2400" dirty="0">
+              <a:solidFill>
+                <a:srgbClr val="FF0000"/>
+              </a:solidFill>
+            </a:endParaRPr>
+          </a:p>
+          <a:p>
+            <a:r>
+              <a:rPr kumimoji="1" lang="en-US" altLang="ja-JP" sz="2400" dirty="0" smtClean="0">
+                <a:solidFill>
+                  <a:srgbClr val="FF0000"/>
+                </a:solidFill>
+              </a:rPr>
+              <a:t>10-2</a:t>
+            </a:r>
+            <a:r>
+              <a:rPr kumimoji="1" lang="ja-JP" altLang="en-US" sz="2400" dirty="0" smtClean="0">
+                <a:solidFill>
+                  <a:srgbClr val="FF0000"/>
+                </a:solidFill>
+              </a:rPr>
+              <a:t>の方が大きいの？</a:t>
+            </a:r>
+            <a:endParaRPr kumimoji="1" lang="en-US" altLang="ja-JP" sz="2400" dirty="0" smtClean="0">
+              <a:solidFill>
+                <a:srgbClr val="FF0000"/>
+              </a:solidFill>
+            </a:endParaRPr>
+          </a:p>
+          <a:p>
+            <a:r>
+              <a:rPr lang="ja-JP" altLang="en-US" sz="2400" dirty="0" smtClean="0">
+                <a:solidFill>
+                  <a:srgbClr val="FF0000"/>
+                </a:solidFill>
+              </a:rPr>
+              <a:t>逆じゃない？</a:t>
+            </a:r>
+            <a:endParaRPr lang="en-US" altLang="ja-JP" sz="2400" dirty="0" smtClean="0">
+              <a:solidFill>
+                <a:srgbClr val="FF0000"/>
+              </a:solidFill>
+            </a:endParaRPr>
+          </a:p>
+          <a:p>
+            <a:endParaRPr kumimoji="1" lang="en-US" altLang="ja-JP" sz="2400" dirty="0">
+              <a:solidFill>
+                <a:srgbClr val="FF0000"/>
+              </a:solidFill>
+            </a:endParaRPr>
+          </a:p>
+        </p:txBody>
+      </p:sp>
     </p:spTree>
     <p:extLst>
       <p:ext uri="{BB962C8B-B14F-4D97-AF65-F5344CB8AC3E}">

</xml_diff>